<commit_message>
Atualização da documentação: correção de nomes de campos, descrições e PBIs conforme orientação do professor
</commit_message>
<xml_diff>
--- a/DOCUMENTACAO/PBB_Chamuze.pptx
+++ b/DOCUMENTACAO/PBB_Chamuze.pptx
@@ -285,7 +285,7 @@
           <a:p>
             <a:fld id="{86D6501E-0A14-4629-8FBF-0ACFB116140F}" type="datetimeFigureOut">
               <a:rPr lang="pt-BR" smtClean="0"/>
-              <a:t>02/04/2025</a:t>
+              <a:t>04/04/2025</a:t>
             </a:fld>
             <a:endParaRPr lang="pt-BR"/>
           </a:p>
@@ -515,7 +515,7 @@
           <a:p>
             <a:fld id="{86D6501E-0A14-4629-8FBF-0ACFB116140F}" type="datetimeFigureOut">
               <a:rPr lang="pt-BR" smtClean="0"/>
-              <a:t>02/04/2025</a:t>
+              <a:t>04/04/2025</a:t>
             </a:fld>
             <a:endParaRPr lang="pt-BR"/>
           </a:p>
@@ -750,7 +750,7 @@
           <a:p>
             <a:fld id="{86D6501E-0A14-4629-8FBF-0ACFB116140F}" type="datetimeFigureOut">
               <a:rPr lang="pt-BR" smtClean="0"/>
-              <a:t>02/04/2025</a:t>
+              <a:t>04/04/2025</a:t>
             </a:fld>
             <a:endParaRPr lang="pt-BR"/>
           </a:p>
@@ -980,7 +980,7 @@
           <a:p>
             <a:fld id="{86D6501E-0A14-4629-8FBF-0ACFB116140F}" type="datetimeFigureOut">
               <a:rPr lang="pt-BR" smtClean="0"/>
-              <a:t>02/04/2025</a:t>
+              <a:t>04/04/2025</a:t>
             </a:fld>
             <a:endParaRPr lang="pt-BR"/>
           </a:p>
@@ -1282,7 +1282,7 @@
           <a:p>
             <a:fld id="{86D6501E-0A14-4629-8FBF-0ACFB116140F}" type="datetimeFigureOut">
               <a:rPr lang="pt-BR" smtClean="0"/>
-              <a:t>02/04/2025</a:t>
+              <a:t>04/04/2025</a:t>
             </a:fld>
             <a:endParaRPr lang="pt-BR"/>
           </a:p>
@@ -1577,7 +1577,7 @@
           <a:p>
             <a:fld id="{86D6501E-0A14-4629-8FBF-0ACFB116140F}" type="datetimeFigureOut">
               <a:rPr lang="pt-BR" smtClean="0"/>
-              <a:t>02/04/2025</a:t>
+              <a:t>04/04/2025</a:t>
             </a:fld>
             <a:endParaRPr lang="pt-BR"/>
           </a:p>
@@ -2025,7 +2025,7 @@
           <a:p>
             <a:fld id="{86D6501E-0A14-4629-8FBF-0ACFB116140F}" type="datetimeFigureOut">
               <a:rPr lang="pt-BR" smtClean="0"/>
-              <a:t>02/04/2025</a:t>
+              <a:t>04/04/2025</a:t>
             </a:fld>
             <a:endParaRPr lang="pt-BR"/>
           </a:p>
@@ -2190,7 +2190,7 @@
           <a:p>
             <a:fld id="{86D6501E-0A14-4629-8FBF-0ACFB116140F}" type="datetimeFigureOut">
               <a:rPr lang="pt-BR" smtClean="0"/>
-              <a:t>02/04/2025</a:t>
+              <a:t>04/04/2025</a:t>
             </a:fld>
             <a:endParaRPr lang="pt-BR"/>
           </a:p>
@@ -2327,7 +2327,7 @@
           <a:p>
             <a:fld id="{86D6501E-0A14-4629-8FBF-0ACFB116140F}" type="datetimeFigureOut">
               <a:rPr lang="pt-BR" smtClean="0"/>
-              <a:t>02/04/2025</a:t>
+              <a:t>04/04/2025</a:t>
             </a:fld>
             <a:endParaRPr lang="pt-BR"/>
           </a:p>
@@ -2668,7 +2668,7 @@
           <a:p>
             <a:fld id="{86D6501E-0A14-4629-8FBF-0ACFB116140F}" type="datetimeFigureOut">
               <a:rPr lang="pt-BR" smtClean="0"/>
-              <a:t>02/04/2025</a:t>
+              <a:t>04/04/2025</a:t>
             </a:fld>
             <a:endParaRPr lang="pt-BR"/>
           </a:p>
@@ -2986,7 +2986,7 @@
           <a:p>
             <a:fld id="{86D6501E-0A14-4629-8FBF-0ACFB116140F}" type="datetimeFigureOut">
               <a:rPr lang="pt-BR" smtClean="0"/>
-              <a:t>02/04/2025</a:t>
+              <a:t>04/04/2025</a:t>
             </a:fld>
             <a:endParaRPr lang="pt-BR"/>
           </a:p>
@@ -4460,14 +4460,14 @@
             <a:p>
               <a:pPr algn="ctr"/>
               <a:r>
-                <a:rPr lang="pt-BR" sz="800">
+                <a:rPr lang="pt-BR" sz="800" dirty="0">
                   <a:solidFill>
                     <a:schemeClr val="bg1"/>
                   </a:solidFill>
                 </a:rPr>
                 <a:t>Envio de serviços para trabalhadores disponíveis</a:t>
               </a:r>
-              <a:endParaRPr lang="pt-BR" sz="800">
+              <a:endParaRPr lang="pt-BR" sz="800" dirty="0">
                 <a:solidFill>
                   <a:schemeClr val="bg1"/>
                 </a:solidFill>
@@ -7679,7 +7679,7 @@
                   <a:ea typeface="Calibri"/>
                   <a:cs typeface="Calibri"/>
                 </a:rPr>
-                <a:t>por categoria de trabalhos</a:t>
+                <a:t>por categoria</a:t>
               </a:r>
             </a:p>
           </p:txBody>

</xml_diff>

<commit_message>
Alterações locais em avaliarPrestadores.php
</commit_message>
<xml_diff>
--- a/DOCUMENTACAO/PBB_Chamuze.pptx
+++ b/DOCUMENTACAO/PBB_Chamuze.pptx
@@ -285,7 +285,7 @@
           <a:p>
             <a:fld id="{86D6501E-0A14-4629-8FBF-0ACFB116140F}" type="datetimeFigureOut">
               <a:rPr lang="pt-BR" smtClean="0"/>
-              <a:t>04/04/2025</a:t>
+              <a:t>23/04/2025</a:t>
             </a:fld>
             <a:endParaRPr lang="pt-BR"/>
           </a:p>
@@ -515,7 +515,7 @@
           <a:p>
             <a:fld id="{86D6501E-0A14-4629-8FBF-0ACFB116140F}" type="datetimeFigureOut">
               <a:rPr lang="pt-BR" smtClean="0"/>
-              <a:t>04/04/2025</a:t>
+              <a:t>23/04/2025</a:t>
             </a:fld>
             <a:endParaRPr lang="pt-BR"/>
           </a:p>
@@ -750,7 +750,7 @@
           <a:p>
             <a:fld id="{86D6501E-0A14-4629-8FBF-0ACFB116140F}" type="datetimeFigureOut">
               <a:rPr lang="pt-BR" smtClean="0"/>
-              <a:t>04/04/2025</a:t>
+              <a:t>23/04/2025</a:t>
             </a:fld>
             <a:endParaRPr lang="pt-BR"/>
           </a:p>
@@ -980,7 +980,7 @@
           <a:p>
             <a:fld id="{86D6501E-0A14-4629-8FBF-0ACFB116140F}" type="datetimeFigureOut">
               <a:rPr lang="pt-BR" smtClean="0"/>
-              <a:t>04/04/2025</a:t>
+              <a:t>23/04/2025</a:t>
             </a:fld>
             <a:endParaRPr lang="pt-BR"/>
           </a:p>
@@ -1282,7 +1282,7 @@
           <a:p>
             <a:fld id="{86D6501E-0A14-4629-8FBF-0ACFB116140F}" type="datetimeFigureOut">
               <a:rPr lang="pt-BR" smtClean="0"/>
-              <a:t>04/04/2025</a:t>
+              <a:t>23/04/2025</a:t>
             </a:fld>
             <a:endParaRPr lang="pt-BR"/>
           </a:p>
@@ -1577,7 +1577,7 @@
           <a:p>
             <a:fld id="{86D6501E-0A14-4629-8FBF-0ACFB116140F}" type="datetimeFigureOut">
               <a:rPr lang="pt-BR" smtClean="0"/>
-              <a:t>04/04/2025</a:t>
+              <a:t>23/04/2025</a:t>
             </a:fld>
             <a:endParaRPr lang="pt-BR"/>
           </a:p>
@@ -2025,7 +2025,7 @@
           <a:p>
             <a:fld id="{86D6501E-0A14-4629-8FBF-0ACFB116140F}" type="datetimeFigureOut">
               <a:rPr lang="pt-BR" smtClean="0"/>
-              <a:t>04/04/2025</a:t>
+              <a:t>23/04/2025</a:t>
             </a:fld>
             <a:endParaRPr lang="pt-BR"/>
           </a:p>
@@ -2190,7 +2190,7 @@
           <a:p>
             <a:fld id="{86D6501E-0A14-4629-8FBF-0ACFB116140F}" type="datetimeFigureOut">
               <a:rPr lang="pt-BR" smtClean="0"/>
-              <a:t>04/04/2025</a:t>
+              <a:t>23/04/2025</a:t>
             </a:fld>
             <a:endParaRPr lang="pt-BR"/>
           </a:p>
@@ -2327,7 +2327,7 @@
           <a:p>
             <a:fld id="{86D6501E-0A14-4629-8FBF-0ACFB116140F}" type="datetimeFigureOut">
               <a:rPr lang="pt-BR" smtClean="0"/>
-              <a:t>04/04/2025</a:t>
+              <a:t>23/04/2025</a:t>
             </a:fld>
             <a:endParaRPr lang="pt-BR"/>
           </a:p>
@@ -2668,7 +2668,7 @@
           <a:p>
             <a:fld id="{86D6501E-0A14-4629-8FBF-0ACFB116140F}" type="datetimeFigureOut">
               <a:rPr lang="pt-BR" smtClean="0"/>
-              <a:t>04/04/2025</a:t>
+              <a:t>23/04/2025</a:t>
             </a:fld>
             <a:endParaRPr lang="pt-BR"/>
           </a:p>
@@ -2986,7 +2986,7 @@
           <a:p>
             <a:fld id="{86D6501E-0A14-4629-8FBF-0ACFB116140F}" type="datetimeFigureOut">
               <a:rPr lang="pt-BR" smtClean="0"/>
-              <a:t>04/04/2025</a:t>
+              <a:t>23/04/2025</a:t>
             </a:fld>
             <a:endParaRPr lang="pt-BR"/>
           </a:p>
@@ -4132,17 +4132,19 @@
             <a:p>
               <a:pPr algn="ctr"/>
               <a:r>
-                <a:rPr lang="pt-BR" sz="1600">
+                <a:rPr lang="pt-BR" sz="1400" dirty="0">
                   <a:solidFill>
                     <a:schemeClr val="tx1"/>
                   </a:solidFill>
                 </a:rPr>
-                <a:t>Solicita Serviço</a:t>
+                <a:t>Publica solicitações de serviços</a:t>
               </a:r>
-              <a:endParaRPr lang="pt-PT">
+              <a:endParaRPr lang="pt-BR" sz="1400" dirty="0">
                 <a:solidFill>
                   <a:schemeClr val="tx1"/>
                 </a:solidFill>
+                <a:ea typeface="Calibri"/>
+                <a:cs typeface="Calibri"/>
               </a:endParaRPr>
             </a:p>
           </p:txBody>
@@ -4263,14 +4265,12 @@
             <a:p>
               <a:pPr algn="ctr"/>
               <a:r>
-                <a:rPr lang="pt-BR" sz="800">
+                <a:rPr lang="pt-BR" sz="800" dirty="0">
                   <a:solidFill>
                     <a:schemeClr val="bg1"/>
                   </a:solidFill>
-                  <a:ea typeface="Calibri"/>
-                  <a:cs typeface="Calibri"/>
                 </a:rPr>
-                <a:t>Horários indisponíveis por parte dos Trabalhadores</a:t>
+                <a:t>Dificuldade em realizar tarefas domésticas.</a:t>
               </a:r>
             </a:p>
           </p:txBody>
@@ -4327,14 +4327,14 @@
             <a:p>
               <a:pPr algn="ctr"/>
               <a:r>
-                <a:rPr lang="pt-BR" sz="800">
+                <a:rPr lang="pt-BR" sz="800" dirty="0">
                   <a:solidFill>
                     <a:schemeClr val="bg1"/>
                   </a:solidFill>
                 </a:rPr>
-                <a:t>Dificuldade em descrever de forma clara a necessidade do serviço</a:t>
+                <a:t>Dificuldade em descrever de forma clara a necessidade do serviço.</a:t>
               </a:r>
-              <a:endParaRPr lang="pt-BR" sz="800">
+              <a:endParaRPr lang="pt-BR" sz="800" dirty="0">
                 <a:solidFill>
                   <a:schemeClr val="bg1"/>
                 </a:solidFill>
@@ -4465,7 +4465,7 @@
                     <a:schemeClr val="bg1"/>
                   </a:solidFill>
                 </a:rPr>
-                <a:t>Envio de serviços para trabalhadores disponíveis</a:t>
+                <a:t>Prestador encontra e realiza a tarefa solicitada.</a:t>
               </a:r>
               <a:endParaRPr lang="pt-BR" sz="800" dirty="0">
                 <a:solidFill>
@@ -4676,12 +4676,13 @@
             <a:p>
               <a:pPr algn="ctr"/>
               <a:r>
-                <a:rPr lang="pt-BR" sz="800" dirty="0">
-                  <a:ea typeface="Calibri"/>
-                  <a:cs typeface="Calibri"/>
-                </a:rPr>
-                <a:t>Aceitar realização de serviços</a:t>
+                <a:rPr lang="pt-BR" sz="800" dirty="0"/>
+                <a:t>Aceita realizar os serviços</a:t>
               </a:r>
+              <a:endParaRPr lang="pt-BR" sz="800" dirty="0">
+                <a:ea typeface="Calibri"/>
+                <a:cs typeface="Calibri"/>
+              </a:endParaRPr>
             </a:p>
           </p:txBody>
         </p:sp>
@@ -4729,10 +4730,10 @@
             <a:p>
               <a:pPr algn="ctr"/>
               <a:r>
-                <a:rPr lang="pt-BR" sz="800"/>
-                <a:t>Disponibiliza-se para serviços</a:t>
+                <a:rPr lang="pt-BR" sz="800" dirty="0"/>
+                <a:t>Envia propostas para os serviços</a:t>
               </a:r>
-              <a:endParaRPr lang="pt-PT"/>
+              <a:endParaRPr lang="pt-PT" dirty="0"/>
             </a:p>
           </p:txBody>
         </p:sp>
@@ -4886,13 +4887,10 @@
             <a:p>
               <a:pPr algn="ctr"/>
               <a:r>
-                <a:rPr lang="pt-BR" sz="800">
-                  <a:ea typeface="Calibri"/>
-                  <a:cs typeface="Calibri"/>
-                </a:rPr>
-                <a:t>Ser encontrado pelos solicitadores</a:t>
+                <a:rPr lang="pt-BR" sz="800" dirty="0"/>
+                <a:t>Valores justos  conforme a tarefa.</a:t>
               </a:r>
-              <a:endParaRPr lang="pt-PT"/>
+              <a:endParaRPr lang="pt-PT" dirty="0"/>
             </a:p>
           </p:txBody>
         </p:sp>
@@ -5365,10 +5363,10 @@
         </p:nvGrpSpPr>
         <p:grpSpPr>
           <a:xfrm>
-            <a:off x="629007" y="1273946"/>
-            <a:ext cx="1978991" cy="2083740"/>
-            <a:chOff x="629007" y="1255658"/>
-            <a:chExt cx="1978991" cy="2083740"/>
+            <a:off x="587937" y="1102731"/>
+            <a:ext cx="2020061" cy="1873775"/>
+            <a:chOff x="587937" y="1084443"/>
+            <a:chExt cx="2020061" cy="1873775"/>
           </a:xfrm>
         </p:grpSpPr>
         <p:sp>
@@ -5385,7 +5383,7 @@
           </p:nvSpPr>
           <p:spPr>
             <a:xfrm>
-              <a:off x="629007" y="1255658"/>
+              <a:off x="602512" y="1103641"/>
               <a:ext cx="900000" cy="528764"/>
             </a:xfrm>
             <a:prstGeom prst="rect">
@@ -5430,7 +5428,7 @@
             <a:p>
               <a:pPr algn="ctr"/>
               <a:r>
-                <a:rPr lang="pt-BR" sz="800">
+                <a:rPr lang="pt-BR" sz="800" dirty="0">
                   <a:solidFill>
                     <a:schemeClr val="bg1"/>
                   </a:solidFill>
@@ -5456,7 +5454,7 @@
           </p:nvSpPr>
           <p:spPr>
             <a:xfrm>
-              <a:off x="1707998" y="1983484"/>
+              <a:off x="1696175" y="1710735"/>
               <a:ext cx="900000" cy="528764"/>
             </a:xfrm>
             <a:prstGeom prst="rect">
@@ -5501,14 +5499,14 @@
             <a:p>
               <a:pPr algn="ctr"/>
               <a:r>
-                <a:rPr lang="pt-BR" sz="800">
+                <a:rPr lang="pt-BR" sz="800" dirty="0">
                   <a:solidFill>
                     <a:schemeClr val="bg1"/>
                   </a:solidFill>
                 </a:rPr>
                 <a:t>Falta de um canal de comunicação direto entre cliente e prestador.</a:t>
               </a:r>
-              <a:endParaRPr lang="pt-PT">
+              <a:endParaRPr lang="pt-PT" dirty="0">
                 <a:solidFill>
                   <a:schemeClr val="bg1"/>
                 </a:solidFill>
@@ -5530,7 +5528,7 @@
           </p:nvSpPr>
           <p:spPr>
             <a:xfrm>
-              <a:off x="1700398" y="1258060"/>
+              <a:off x="1670286" y="1084443"/>
               <a:ext cx="900000" cy="528764"/>
             </a:xfrm>
             <a:prstGeom prst="rect">
@@ -5579,10 +5577,8 @@
                   <a:solidFill>
                     <a:schemeClr val="bg1"/>
                   </a:solidFill>
-                  <a:ea typeface="Calibri"/>
-                  <a:cs typeface="Calibri"/>
                 </a:rPr>
-                <a:t>Falta de avaliação do trabalhador</a:t>
+                <a:t>Falta de feedback sobre o prestador de serviço.</a:t>
               </a:r>
             </a:p>
           </p:txBody>
@@ -5601,7 +5597,7 @@
           </p:nvSpPr>
           <p:spPr>
             <a:xfrm>
-              <a:off x="629007" y="1985272"/>
+              <a:off x="602512" y="1743487"/>
               <a:ext cx="900000" cy="528764"/>
             </a:xfrm>
             <a:prstGeom prst="rect">
@@ -5646,7 +5642,7 @@
             <a:p>
               <a:pPr algn="ctr"/>
               <a:r>
-                <a:rPr lang="pt-BR" sz="800">
+                <a:rPr lang="pt-BR" sz="800" dirty="0">
                   <a:solidFill>
                     <a:schemeClr val="bg1"/>
                   </a:solidFill>
@@ -5672,7 +5668,7 @@
           </p:nvSpPr>
           <p:spPr>
             <a:xfrm>
-              <a:off x="635102" y="2804538"/>
+              <a:off x="587937" y="2429454"/>
               <a:ext cx="900000" cy="528764"/>
             </a:xfrm>
             <a:prstGeom prst="rect">
@@ -5717,20 +5713,13 @@
             <a:p>
               <a:pPr algn="ctr"/>
               <a:r>
-                <a:rPr lang="pt-BR" sz="800">
+                <a:rPr lang="pt-BR" sz="800" dirty="0">
                   <a:solidFill>
                     <a:schemeClr val="bg1"/>
                   </a:solidFill>
-                  <a:ea typeface="Calibri"/>
-                  <a:cs typeface="Calibri"/>
                 </a:rPr>
-                <a:t>Dificuldade em encontrar trabalhadores disponíveis.</a:t>
+                <a:t>Dificuldade em realizar tarefas domésticas.</a:t>
               </a:r>
-              <a:endParaRPr lang="pt-PT">
-                <a:solidFill>
-                  <a:schemeClr val="bg1"/>
-                </a:solidFill>
-              </a:endParaRPr>
             </a:p>
           </p:txBody>
         </p:sp>
@@ -5748,7 +5737,7 @@
           </p:nvSpPr>
           <p:spPr>
             <a:xfrm>
-              <a:off x="1694302" y="2810634"/>
+              <a:off x="1707998" y="2419746"/>
               <a:ext cx="900000" cy="528764"/>
             </a:xfrm>
             <a:prstGeom prst="rect">
@@ -5793,7 +5782,7 @@
             <a:p>
               <a:pPr algn="ctr"/>
               <a:r>
-                <a:rPr lang="pt-BR" sz="800">
+                <a:rPr lang="pt-BR" sz="800" dirty="0">
                   <a:solidFill>
                     <a:schemeClr val="bg1"/>
                   </a:solidFill>
@@ -5820,10 +5809,10 @@
         </p:nvGrpSpPr>
         <p:grpSpPr>
           <a:xfrm>
-            <a:off x="642701" y="4090782"/>
-            <a:ext cx="1943981" cy="1877132"/>
-            <a:chOff x="673180" y="3870879"/>
-            <a:chExt cx="1943981" cy="1877132"/>
+            <a:off x="620850" y="3771979"/>
+            <a:ext cx="2087766" cy="1964648"/>
+            <a:chOff x="630013" y="3518981"/>
+            <a:chExt cx="2087766" cy="1964648"/>
           </a:xfrm>
         </p:grpSpPr>
         <p:sp>
@@ -5840,7 +5829,69 @@
           </p:nvSpPr>
           <p:spPr>
             <a:xfrm>
-              <a:off x="714350" y="3886765"/>
+              <a:off x="630013" y="3518981"/>
+              <a:ext cx="1018286" cy="762911"/>
+            </a:xfrm>
+            <a:prstGeom prst="rect">
+              <a:avLst/>
+            </a:prstGeom>
+            <a:solidFill>
+              <a:srgbClr val="FBAB53"/>
+            </a:solidFill>
+            <a:ln>
+              <a:solidFill>
+                <a:schemeClr val="accent2"/>
+              </a:solidFill>
+            </a:ln>
+            <a:effectLst>
+              <a:outerShdw blurRad="50800" dist="38100" dir="5400000" algn="t" rotWithShape="0">
+                <a:prstClr val="black">
+                  <a:alpha val="40000"/>
+                </a:prstClr>
+              </a:outerShdw>
+            </a:effectLst>
+          </p:spPr>
+          <p:style>
+            <a:lnRef idx="1">
+              <a:schemeClr val="accent4"/>
+            </a:lnRef>
+            <a:fillRef idx="2">
+              <a:schemeClr val="accent4"/>
+            </a:fillRef>
+            <a:effectRef idx="1">
+              <a:schemeClr val="accent4"/>
+            </a:effectRef>
+            <a:fontRef idx="minor">
+              <a:schemeClr val="dk1"/>
+            </a:fontRef>
+          </p:style>
+          <p:txBody>
+            <a:bodyPr lIns="0" tIns="0" rIns="0" bIns="0" rtlCol="0" anchor="ctr"/>
+            <a:lstStyle/>
+            <a:p>
+              <a:pPr algn="ctr"/>
+              <a:r>
+                <a:rPr lang="pt-BR" sz="800" dirty="0"/>
+                <a:t>Sistema de validação em que o administrador analisa o perfil do prestador antes da aprovação.</a:t>
+              </a:r>
+            </a:p>
+          </p:txBody>
+        </p:sp>
+        <p:sp>
+          <p:nvSpPr>
+            <p:cNvPr id="39" name="Retângulo 38">
+              <a:extLst>
+                <a:ext uri="{FF2B5EF4-FFF2-40B4-BE49-F238E27FC236}">
+                  <a16:creationId xmlns:a16="http://schemas.microsoft.com/office/drawing/2014/main" id="{96C591EC-9790-E29C-D91B-1B22DEC246EF}"/>
+                </a:ext>
+              </a:extLst>
+            </p:cNvPr>
+            <p:cNvSpPr/>
+            <p:nvPr/>
+          </p:nvSpPr>
+          <p:spPr>
+            <a:xfrm>
+              <a:off x="1817779" y="4211156"/>
               <a:ext cx="900000" cy="528764"/>
             </a:xfrm>
             <a:prstGeom prst="rect">
@@ -5882,18 +5933,22 @@
             <a:p>
               <a:pPr algn="ctr"/>
               <a:r>
-                <a:rPr lang="pt-BR" sz="800"/>
-                <a:t>Sistema de avaliação com base nos feedbacks dos solicitadores.</a:t>
+                <a:rPr lang="pt-BR" sz="800" dirty="0"/>
+                <a:t>Canal de chat direto entre solicitante e prestador.</a:t>
               </a:r>
+              <a:endParaRPr lang="pt-BR" sz="800" dirty="0">
+                <a:ea typeface="Calibri"/>
+                <a:cs typeface="Calibri"/>
+              </a:endParaRPr>
             </a:p>
           </p:txBody>
         </p:sp>
         <p:sp>
           <p:nvSpPr>
-            <p:cNvPr id="39" name="Retângulo 38">
+            <p:cNvPr id="41" name="Retângulo 40">
               <a:extLst>
                 <a:ext uri="{FF2B5EF4-FFF2-40B4-BE49-F238E27FC236}">
-                  <a16:creationId xmlns:a16="http://schemas.microsoft.com/office/drawing/2014/main" id="{96C591EC-9790-E29C-D91B-1B22DEC246EF}"/>
+                  <a16:creationId xmlns:a16="http://schemas.microsoft.com/office/drawing/2014/main" id="{F0E65F83-37D7-3D38-E1AE-377DBFD3BFF5}"/>
                 </a:ext>
               </a:extLst>
             </p:cNvPr>
@@ -5902,7 +5957,7 @@
           </p:nvSpPr>
           <p:spPr>
             <a:xfrm>
-              <a:off x="1697329" y="4528910"/>
+              <a:off x="1784840" y="3573402"/>
               <a:ext cx="900000" cy="528764"/>
             </a:xfrm>
             <a:prstGeom prst="rect">
@@ -5944,21 +5999,22 @@
             <a:p>
               <a:pPr algn="ctr"/>
               <a:r>
-                <a:rPr lang="pt-BR" sz="800">
-                  <a:ea typeface="Calibri"/>
-                  <a:cs typeface="Calibri"/>
+                <a:rPr lang="pt-BR" sz="800" dirty="0">
+                  <a:solidFill>
+                    <a:schemeClr val="tx1"/>
+                  </a:solidFill>
                 </a:rPr>
-                <a:t>Canal de conexão entre o Cliente e o Prestador </a:t>
+                <a:t>Sistema de avaliação onde o solicitante avalia o prestador.</a:t>
               </a:r>
             </a:p>
           </p:txBody>
         </p:sp>
         <p:sp>
           <p:nvSpPr>
-            <p:cNvPr id="41" name="Retângulo 40">
+            <p:cNvPr id="42" name="Retângulo 41">
               <a:extLst>
                 <a:ext uri="{FF2B5EF4-FFF2-40B4-BE49-F238E27FC236}">
-                  <a16:creationId xmlns:a16="http://schemas.microsoft.com/office/drawing/2014/main" id="{F0E65F83-37D7-3D38-E1AE-377DBFD3BFF5}"/>
+                  <a16:creationId xmlns:a16="http://schemas.microsoft.com/office/drawing/2014/main" id="{EF1CB9BC-A9B5-DD5E-22B4-90C5AD231AC6}"/>
                 </a:ext>
               </a:extLst>
             </p:cNvPr>
@@ -5967,7 +6023,7 @@
           </p:nvSpPr>
           <p:spPr>
             <a:xfrm>
-              <a:off x="1700397" y="3870879"/>
+              <a:off x="689156" y="4346059"/>
               <a:ext cx="900000" cy="528764"/>
             </a:xfrm>
             <a:prstGeom prst="rect">
@@ -6013,72 +6069,7 @@
                   <a:ea typeface="Calibri"/>
                   <a:cs typeface="Calibri"/>
                 </a:rPr>
-                <a:t>Avaliação do trabalhador</a:t>
-              </a:r>
-            </a:p>
-          </p:txBody>
-        </p:sp>
-        <p:sp>
-          <p:nvSpPr>
-            <p:cNvPr id="42" name="Retângulo 41">
-              <a:extLst>
-                <a:ext uri="{FF2B5EF4-FFF2-40B4-BE49-F238E27FC236}">
-                  <a16:creationId xmlns:a16="http://schemas.microsoft.com/office/drawing/2014/main" id="{EF1CB9BC-A9B5-DD5E-22B4-90C5AD231AC6}"/>
-                </a:ext>
-              </a:extLst>
-            </p:cNvPr>
-            <p:cNvSpPr/>
-            <p:nvPr/>
-          </p:nvSpPr>
-          <p:spPr>
-            <a:xfrm>
-              <a:off x="701181" y="4529511"/>
-              <a:ext cx="900000" cy="528764"/>
-            </a:xfrm>
-            <a:prstGeom prst="rect">
-              <a:avLst/>
-            </a:prstGeom>
-            <a:solidFill>
-              <a:srgbClr val="FBAB53"/>
-            </a:solidFill>
-            <a:ln>
-              <a:solidFill>
-                <a:schemeClr val="accent2"/>
-              </a:solidFill>
-            </a:ln>
-            <a:effectLst>
-              <a:outerShdw blurRad="50800" dist="38100" dir="5400000" algn="t" rotWithShape="0">
-                <a:prstClr val="black">
-                  <a:alpha val="40000"/>
-                </a:prstClr>
-              </a:outerShdw>
-            </a:effectLst>
-          </p:spPr>
-          <p:style>
-            <a:lnRef idx="1">
-              <a:schemeClr val="accent4"/>
-            </a:lnRef>
-            <a:fillRef idx="2">
-              <a:schemeClr val="accent4"/>
-            </a:fillRef>
-            <a:effectRef idx="1">
-              <a:schemeClr val="accent4"/>
-            </a:effectRef>
-            <a:fontRef idx="minor">
-              <a:schemeClr val="dk1"/>
-            </a:fontRef>
-          </p:style>
-          <p:txBody>
-            <a:bodyPr lIns="0" tIns="0" rIns="0" bIns="0" rtlCol="0" anchor="ctr"/>
-            <a:lstStyle/>
-            <a:p>
-              <a:pPr algn="ctr"/>
-              <a:r>
-                <a:rPr lang="pt-BR" sz="800" dirty="0">
-                  <a:ea typeface="Calibri"/>
-                  <a:cs typeface="Calibri"/>
-                </a:rPr>
-                <a:t>Recomendação de  trabalhos(serviços) disponíveis</a:t>
+                <a:t>Recomendação de  trabalhos(serviços) disponíveis.</a:t>
               </a:r>
             </a:p>
             <a:p>
@@ -6104,7 +6095,7 @@
           </p:nvSpPr>
           <p:spPr>
             <a:xfrm>
-              <a:off x="673180" y="5201498"/>
+              <a:off x="688267" y="4954865"/>
               <a:ext cx="900000" cy="528764"/>
             </a:xfrm>
             <a:prstGeom prst="rect">
@@ -6147,7 +6138,7 @@
               <a:pPr algn="ctr"/>
               <a:r>
                 <a:rPr lang="pt-BR" sz="800" dirty="0"/>
-                <a:t>Recomendação de serviços para trabalhadores disponíveis </a:t>
+                <a:t>Publicação de solicitações de serviços domésticos.</a:t>
               </a:r>
               <a:endParaRPr lang="pt-PT" dirty="0"/>
             </a:p>
@@ -6167,7 +6158,7 @@
           </p:nvSpPr>
           <p:spPr>
             <a:xfrm>
-              <a:off x="1717161" y="5219247"/>
+              <a:off x="1784840" y="4954865"/>
               <a:ext cx="900000" cy="528764"/>
             </a:xfrm>
             <a:prstGeom prst="rect">
@@ -6209,8 +6200,8 @@
             <a:p>
               <a:pPr algn="ctr"/>
               <a:r>
-                <a:rPr lang="pt-BR" sz="800"/>
-                <a:t>Criar filtros de categorias de serviços.</a:t>
+                <a:rPr lang="pt-BR" sz="800" dirty="0"/>
+                <a:t>Sistema de filtros por categoria.</a:t>
               </a:r>
             </a:p>
           </p:txBody>
@@ -6717,10 +6708,10 @@
         </p:nvGrpSpPr>
         <p:grpSpPr>
           <a:xfrm>
-            <a:off x="8786769" y="2333338"/>
-            <a:ext cx="3071859" cy="1362031"/>
-            <a:chOff x="2771606" y="1213006"/>
-            <a:chExt cx="2916093" cy="1010930"/>
+            <a:off x="8800470" y="2475955"/>
+            <a:ext cx="3082677" cy="1077045"/>
+            <a:chOff x="2784611" y="1318859"/>
+            <a:chExt cx="2926362" cy="799407"/>
           </a:xfrm>
           <a:effectLst>
             <a:outerShdw blurRad="50800" dist="38100" dir="5400000" algn="t" rotWithShape="0">
@@ -6802,7 +6793,7 @@
           </p:nvSpPr>
           <p:spPr>
             <a:xfrm>
-              <a:off x="2803831" y="1213007"/>
+              <a:off x="2797777" y="1349008"/>
               <a:ext cx="827881" cy="269132"/>
             </a:xfrm>
             <a:prstGeom prst="rect">
@@ -6871,7 +6862,7 @@
           </p:nvSpPr>
           <p:spPr>
             <a:xfrm>
-              <a:off x="2783182" y="1503959"/>
+              <a:off x="2784611" y="1685595"/>
               <a:ext cx="866097" cy="369439"/>
             </a:xfrm>
             <a:prstGeom prst="rect">
@@ -6928,75 +6919,6 @@
         </p:sp>
         <p:sp>
           <p:nvSpPr>
-            <p:cNvPr id="66" name="Retângulo 65">
-              <a:extLst>
-                <a:ext uri="{FF2B5EF4-FFF2-40B4-BE49-F238E27FC236}">
-                  <a16:creationId xmlns:a16="http://schemas.microsoft.com/office/drawing/2014/main" id="{5F13B3E8-106B-9F75-1BBF-A5D6475BDF10}"/>
-                </a:ext>
-              </a:extLst>
-            </p:cNvPr>
-            <p:cNvSpPr/>
-            <p:nvPr/>
-          </p:nvSpPr>
-          <p:spPr>
-            <a:xfrm>
-              <a:off x="2771606" y="1911172"/>
-              <a:ext cx="883253" cy="312764"/>
-            </a:xfrm>
-            <a:prstGeom prst="rect">
-              <a:avLst/>
-            </a:prstGeom>
-            <a:solidFill>
-              <a:schemeClr val="tx1">
-                <a:lumMod val="65000"/>
-                <a:lumOff val="35000"/>
-              </a:schemeClr>
-            </a:solidFill>
-            <a:ln>
-              <a:solidFill>
-                <a:schemeClr val="tx1"/>
-              </a:solidFill>
-            </a:ln>
-          </p:spPr>
-          <p:style>
-            <a:lnRef idx="1">
-              <a:schemeClr val="accent4"/>
-            </a:lnRef>
-            <a:fillRef idx="2">
-              <a:schemeClr val="accent4"/>
-            </a:fillRef>
-            <a:effectRef idx="1">
-              <a:schemeClr val="accent4"/>
-            </a:effectRef>
-            <a:fontRef idx="minor">
-              <a:schemeClr val="dk1"/>
-            </a:fontRef>
-          </p:style>
-          <p:txBody>
-            <a:bodyPr lIns="0" tIns="0" rIns="0" bIns="0" rtlCol="0" anchor="ctr"/>
-            <a:lstStyle/>
-            <a:p>
-              <a:pPr algn="ctr"/>
-              <a:r>
-                <a:rPr lang="pt-BR" sz="800" dirty="0">
-                  <a:solidFill>
-                    <a:schemeClr val="bg1"/>
-                  </a:solidFill>
-                </a:rPr>
-                <a:t>Baixa qualidade dos serviços prestados</a:t>
-              </a:r>
-              <a:endParaRPr lang="pt-BR" sz="800" dirty="0">
-                <a:solidFill>
-                  <a:schemeClr val="bg1"/>
-                </a:solidFill>
-                <a:ea typeface="Calibri"/>
-                <a:cs typeface="Calibri"/>
-              </a:endParaRPr>
-            </a:p>
-          </p:txBody>
-        </p:sp>
-        <p:sp>
-          <p:nvSpPr>
             <p:cNvPr id="67" name="Retângulo 66">
               <a:extLst>
                 <a:ext uri="{FF2B5EF4-FFF2-40B4-BE49-F238E27FC236}">
@@ -7009,7 +6931,7 @@
           </p:nvSpPr>
           <p:spPr>
             <a:xfrm>
-              <a:off x="4859818" y="1213006"/>
+              <a:off x="4883092" y="1348744"/>
               <a:ext cx="827881" cy="269132"/>
             </a:xfrm>
             <a:prstGeom prst="rect">
@@ -7078,7 +7000,7 @@
           </p:nvSpPr>
           <p:spPr>
             <a:xfrm>
-              <a:off x="4838565" y="1522954"/>
+              <a:off x="4859818" y="1674493"/>
               <a:ext cx="827881" cy="382117"/>
             </a:xfrm>
             <a:prstGeom prst="rect">
@@ -7122,75 +7044,6 @@
                   </a:solidFill>
                 </a:rPr>
                 <a:t>Construção de uma comunidade de prestadores confiáveis</a:t>
-              </a:r>
-              <a:endParaRPr lang="pt-BR" sz="800" dirty="0">
-                <a:solidFill>
-                  <a:schemeClr val="bg1"/>
-                </a:solidFill>
-                <a:ea typeface="Calibri"/>
-                <a:cs typeface="Calibri"/>
-              </a:endParaRPr>
-            </a:p>
-          </p:txBody>
-        </p:sp>
-        <p:sp>
-          <p:nvSpPr>
-            <p:cNvPr id="69" name="Retângulo 68">
-              <a:extLst>
-                <a:ext uri="{FF2B5EF4-FFF2-40B4-BE49-F238E27FC236}">
-                  <a16:creationId xmlns:a16="http://schemas.microsoft.com/office/drawing/2014/main" id="{73CAA522-3712-C255-9917-5440D7A33BB1}"/>
-                </a:ext>
-              </a:extLst>
-            </p:cNvPr>
-            <p:cNvSpPr/>
-            <p:nvPr/>
-          </p:nvSpPr>
-          <p:spPr>
-            <a:xfrm>
-              <a:off x="4832574" y="1954804"/>
-              <a:ext cx="827881" cy="269132"/>
-            </a:xfrm>
-            <a:prstGeom prst="rect">
-              <a:avLst/>
-            </a:prstGeom>
-            <a:solidFill>
-              <a:schemeClr val="tx1">
-                <a:lumMod val="65000"/>
-                <a:lumOff val="35000"/>
-              </a:schemeClr>
-            </a:solidFill>
-            <a:ln>
-              <a:solidFill>
-                <a:schemeClr val="tx1"/>
-              </a:solidFill>
-            </a:ln>
-          </p:spPr>
-          <p:style>
-            <a:lnRef idx="1">
-              <a:schemeClr val="accent4"/>
-            </a:lnRef>
-            <a:fillRef idx="2">
-              <a:schemeClr val="accent4"/>
-            </a:fillRef>
-            <a:effectRef idx="1">
-              <a:schemeClr val="accent4"/>
-            </a:effectRef>
-            <a:fontRef idx="minor">
-              <a:schemeClr val="dk1"/>
-            </a:fontRef>
-          </p:style>
-          <p:txBody>
-            <a:bodyPr lIns="0" tIns="0" rIns="0" bIns="0" rtlCol="0" anchor="ctr"/>
-            <a:lstStyle/>
-            <a:p>
-              <a:pPr algn="ctr"/>
-              <a:r>
-                <a:rPr lang="pt-BR" sz="800" dirty="0">
-                  <a:solidFill>
-                    <a:schemeClr val="bg1"/>
-                  </a:solidFill>
-                </a:rPr>
-                <a:t>Redução de disputas e problemas</a:t>
               </a:r>
               <a:endParaRPr lang="pt-BR" sz="800" dirty="0">
                 <a:solidFill>
@@ -7284,39 +7137,33 @@
             <a:p>
               <a:pPr algn="ctr"/>
               <a:r>
-                <a:rPr lang="pt-BR" sz="800">
+                <a:rPr lang="pt-BR" sz="800" dirty="0">
                   <a:ea typeface="Calibri"/>
                   <a:cs typeface="Calibri"/>
                 </a:rPr>
-                <a:t>Selecionar</a:t>
+                <a:t>Realizar a</a:t>
               </a:r>
-              <a:br>
-                <a:rPr lang="pt-BR" sz="800">
+            </a:p>
+            <a:p>
+              <a:pPr algn="ctr"/>
+              <a:r>
+                <a:rPr lang="pt-BR" sz="800" dirty="0">
                   <a:ea typeface="Calibri"/>
                   <a:cs typeface="Calibri"/>
                 </a:rPr>
-              </a:br>
+                <a:t>Avaliação </a:t>
+              </a:r>
+            </a:p>
+            <a:p>
+              <a:pPr algn="ctr"/>
               <a:r>
-                <a:rPr lang="pt-BR" sz="800">
+                <a:rPr lang="pt-BR" sz="800" dirty="0">
                   <a:ea typeface="Calibri"/>
                   <a:cs typeface="Calibri"/>
                 </a:rPr>
-                <a:t>Categoria</a:t>
+                <a:t>De prestadores</a:t>
               </a:r>
-              <a:br>
-                <a:rPr lang="pt-BR" sz="800">
-                  <a:ea typeface="Calibri"/>
-                  <a:cs typeface="Calibri"/>
-                </a:rPr>
-              </a:br>
-              <a:r>
-                <a:rPr lang="pt-BR" sz="800">
-                  <a:ea typeface="Calibri"/>
-                  <a:cs typeface="Calibri"/>
-                </a:rPr>
-                <a:t>do serviço</a:t>
-              </a:r>
-              <a:endParaRPr lang="pt-BR"/>
+              <a:endParaRPr lang="pt-BR" dirty="0"/>
             </a:p>
           </p:txBody>
         </p:sp>
@@ -7479,7 +7326,17 @@
                   <a:ea typeface="Calibri"/>
                   <a:cs typeface="Calibri"/>
                 </a:rPr>
-                <a:t>proposta  para a realização dos serviços</a:t>
+                <a:t>Proposta</a:t>
+              </a:r>
+            </a:p>
+            <a:p>
+              <a:pPr algn="ctr"/>
+              <a:r>
+                <a:rPr lang="pt-BR" sz="800" dirty="0">
+                  <a:ea typeface="Calibri"/>
+                  <a:cs typeface="Calibri"/>
+                </a:rPr>
+                <a:t>De serviço</a:t>
               </a:r>
             </a:p>
           </p:txBody>
@@ -8235,10 +8092,10 @@
         </p:nvGrpSpPr>
         <p:grpSpPr>
           <a:xfrm>
-            <a:off x="2861311" y="1218079"/>
-            <a:ext cx="2998115" cy="953530"/>
-            <a:chOff x="2825364" y="1326974"/>
-            <a:chExt cx="2845421" cy="890781"/>
+            <a:off x="2886114" y="1218079"/>
+            <a:ext cx="2967113" cy="953530"/>
+            <a:chOff x="2848903" y="1326974"/>
+            <a:chExt cx="2815998" cy="890781"/>
           </a:xfrm>
           <a:effectLst>
             <a:outerShdw blurRad="50800" dist="38100" dir="5400000" algn="t" rotWithShape="0">
@@ -8320,7 +8177,7 @@
           </p:nvSpPr>
           <p:spPr>
             <a:xfrm>
-              <a:off x="2834149" y="1437491"/>
+              <a:off x="2863725" y="1453232"/>
               <a:ext cx="827881" cy="269132"/>
             </a:xfrm>
             <a:prstGeom prst="rect">
@@ -8350,12 +8207,13 @@
             <a:p>
               <a:pPr algn="ctr"/>
               <a:r>
-                <a:rPr lang="pt-BR" sz="800" dirty="0">
-                  <a:ea typeface="Calibri"/>
-                  <a:cs typeface="Calibri"/>
-                </a:rPr>
-                <a:t>Solicita Serviço</a:t>
+                <a:rPr lang="pt-BR" sz="800" dirty="0"/>
+                <a:t>Publica solicitações de serviços</a:t>
               </a:r>
+              <a:endParaRPr lang="pt-BR" sz="800" dirty="0">
+                <a:ea typeface="Calibri"/>
+                <a:cs typeface="Calibri"/>
+              </a:endParaRPr>
             </a:p>
           </p:txBody>
         </p:sp>
@@ -8373,7 +8231,7 @@
           </p:nvSpPr>
           <p:spPr>
             <a:xfrm>
-              <a:off x="2825364" y="1828520"/>
+              <a:off x="2848903" y="1805874"/>
               <a:ext cx="827881" cy="269132"/>
             </a:xfrm>
             <a:prstGeom prst="rect">
@@ -8427,7 +8285,7 @@
           </p:nvSpPr>
           <p:spPr>
             <a:xfrm>
-              <a:off x="4835597" y="1398783"/>
+              <a:off x="4830779" y="1430246"/>
               <a:ext cx="827881" cy="269132"/>
             </a:xfrm>
             <a:prstGeom prst="rect">
@@ -8457,12 +8315,13 @@
             <a:p>
               <a:pPr algn="ctr"/>
               <a:r>
-                <a:rPr lang="pt-BR" sz="800" dirty="0">
-                  <a:ea typeface="Calibri"/>
-                  <a:cs typeface="Calibri"/>
-                </a:rPr>
-                <a:t>Encontra serviços</a:t>
+                <a:rPr lang="pt-BR" sz="800" dirty="0"/>
+                <a:t>Ser encontrado por prestadores</a:t>
               </a:r>
+              <a:endParaRPr lang="pt-BR" sz="800" dirty="0">
+                <a:ea typeface="Calibri"/>
+                <a:cs typeface="Calibri"/>
+              </a:endParaRPr>
             </a:p>
           </p:txBody>
         </p:sp>
@@ -8480,7 +8339,7 @@
           </p:nvSpPr>
           <p:spPr>
             <a:xfrm>
-              <a:off x="4842904" y="1855108"/>
+              <a:off x="4837020" y="1765593"/>
               <a:ext cx="827881" cy="269132"/>
             </a:xfrm>
             <a:prstGeom prst="rect">
@@ -8510,7 +8369,7 @@
             <a:p>
               <a:pPr algn="ctr"/>
               <a:r>
-                <a:rPr lang="pt-BR" sz="800">
+                <a:rPr lang="pt-BR" sz="800" dirty="0">
                   <a:ea typeface="Calibri"/>
                   <a:cs typeface="Calibri"/>
                 </a:rPr>
@@ -9252,7 +9111,7 @@
         </p:nvSpPr>
         <p:spPr>
           <a:xfrm>
-            <a:off x="2833824" y="5915793"/>
+            <a:off x="2868522" y="5949526"/>
             <a:ext cx="1133057" cy="528764"/>
           </a:xfrm>
           <a:prstGeom prst="rect">
@@ -9319,6 +9178,269 @@
                 <a:cs typeface="Calibri"/>
               </a:rPr>
               <a:t>do serviço</a:t>
+            </a:r>
+          </a:p>
+        </p:txBody>
+      </p:sp>
+      <p:sp>
+        <p:nvSpPr>
+          <p:cNvPr id="31" name="Rectangle 1">
+            <a:extLst>
+              <a:ext uri="{FF2B5EF4-FFF2-40B4-BE49-F238E27FC236}">
+                <a16:creationId xmlns:a16="http://schemas.microsoft.com/office/drawing/2014/main" id="{774A3A96-7C07-A2E1-87DF-B3B239A3F876}"/>
+              </a:ext>
+            </a:extLst>
+          </p:cNvPr>
+          <p:cNvSpPr>
+            <a:spLocks noChangeArrowheads="1"/>
+          </p:cNvSpPr>
+          <p:nvPr/>
+        </p:nvSpPr>
+        <p:spPr bwMode="auto">
+          <a:xfrm>
+            <a:off x="0" y="0"/>
+            <a:ext cx="12192000" cy="0"/>
+          </a:xfrm>
+          <a:prstGeom prst="rect">
+            <a:avLst/>
+          </a:prstGeom>
+          <a:noFill/>
+          <a:ln>
+            <a:noFill/>
+          </a:ln>
+          <a:effectLst/>
+          <a:extLst>
+            <a:ext uri="{909E8E84-426E-40DD-AFC4-6F175D3DCCD1}">
+              <a14:hiddenFill xmlns:a14="http://schemas.microsoft.com/office/drawing/2010/main">
+                <a:solidFill>
+                  <a:schemeClr val="accent1"/>
+                </a:solidFill>
+              </a14:hiddenFill>
+            </a:ext>
+            <a:ext uri="{91240B29-F687-4F45-9708-019B960494DF}">
+              <a14:hiddenLine xmlns:a14="http://schemas.microsoft.com/office/drawing/2010/main" w="9525">
+                <a:solidFill>
+                  <a:schemeClr val="tx1"/>
+                </a:solidFill>
+                <a:miter lim="800000"/>
+                <a:headEnd/>
+                <a:tailEnd/>
+              </a14:hiddenLine>
+            </a:ext>
+            <a:ext uri="{AF507438-7753-43E0-B8FC-AC1667EBCBE1}">
+              <a14:hiddenEffects xmlns:a14="http://schemas.microsoft.com/office/drawing/2010/main">
+                <a:effectLst>
+                  <a:outerShdw dist="35921" dir="2700000" algn="ctr" rotWithShape="0">
+                    <a:schemeClr val="bg2"/>
+                  </a:outerShdw>
+                </a:effectLst>
+              </a14:hiddenEffects>
+            </a:ext>
+          </a:extLst>
+        </p:spPr>
+        <p:txBody>
+          <a:bodyPr vert="horz" wrap="none" lIns="91440" tIns="45720" rIns="91440" bIns="45720" numCol="1" anchor="ctr" anchorCtr="0" compatLnSpc="1">
+            <a:prstTxWarp prst="textNoShape">
+              <a:avLst/>
+            </a:prstTxWarp>
+            <a:spAutoFit/>
+          </a:bodyPr>
+          <a:lstStyle/>
+          <a:p>
+            <a:pPr marL="0" marR="0" lvl="0" indent="0" algn="l" defTabSz="914400" rtl="0" eaLnBrk="0" fontAlgn="base" latinLnBrk="0" hangingPunct="0">
+              <a:lnSpc>
+                <a:spcPct val="100000"/>
+              </a:lnSpc>
+              <a:spcBef>
+                <a:spcPct val="0"/>
+              </a:spcBef>
+              <a:spcAft>
+                <a:spcPct val="0"/>
+              </a:spcAft>
+              <a:buClrTx/>
+              <a:buSzTx/>
+              <a:buFontTx/>
+              <a:buNone/>
+              <a:tabLst/>
+            </a:pPr>
+            <a:r>
+              <a:rPr kumimoji="0" lang="pt-BR" altLang="pt-BR" sz="1800" b="0" i="0" u="none" strike="noStrike" cap="none" normalizeH="0" baseline="0" dirty="0">
+                <a:ln>
+                  <a:noFill/>
+                </a:ln>
+                <a:solidFill>
+                  <a:schemeClr val="tx1"/>
+                </a:solidFill>
+                <a:effectLst/>
+                <a:latin typeface="Arial" panose="020B0604020202020204" pitchFamily="34" charset="0"/>
+              </a:rPr>
+              <a:t>valores justos de acordo conforme a tarefa.</a:t>
+            </a:r>
+          </a:p>
+          <a:p>
+            <a:pPr marL="0" marR="0" lvl="0" indent="0" algn="l" defTabSz="914400" rtl="0" eaLnBrk="0" fontAlgn="base" latinLnBrk="0" hangingPunct="0">
+              <a:lnSpc>
+                <a:spcPct val="100000"/>
+              </a:lnSpc>
+              <a:spcBef>
+                <a:spcPct val="0"/>
+              </a:spcBef>
+              <a:spcAft>
+                <a:spcPct val="0"/>
+              </a:spcAft>
+              <a:buClrTx/>
+              <a:buSzTx/>
+              <a:buFontTx/>
+              <a:buNone/>
+              <a:tabLst/>
+            </a:pPr>
+            <a:endParaRPr kumimoji="0" lang="pt-BR" altLang="pt-BR" sz="1800" b="0" i="0" u="none" strike="noStrike" cap="none" normalizeH="0" baseline="0" dirty="0">
+              <a:ln>
+                <a:noFill/>
+              </a:ln>
+              <a:solidFill>
+                <a:schemeClr val="tx1"/>
+              </a:solidFill>
+              <a:effectLst/>
+              <a:latin typeface="Arial" panose="020B0604020202020204" pitchFamily="34" charset="0"/>
+            </a:endParaRPr>
+          </a:p>
+        </p:txBody>
+      </p:sp>
+      <p:sp>
+        <p:nvSpPr>
+          <p:cNvPr id="46" name="Retângulo 45">
+            <a:extLst>
+              <a:ext uri="{FF2B5EF4-FFF2-40B4-BE49-F238E27FC236}">
+                <a16:creationId xmlns:a16="http://schemas.microsoft.com/office/drawing/2014/main" id="{3A1430C1-E57B-1F5B-921F-196EC8EB4EBF}"/>
+              </a:ext>
+            </a:extLst>
+          </p:cNvPr>
+          <p:cNvSpPr/>
+          <p:nvPr/>
+        </p:nvSpPr>
+        <p:spPr>
+          <a:xfrm>
+            <a:off x="1142018" y="3086012"/>
+            <a:ext cx="900000" cy="528764"/>
+          </a:xfrm>
+          <a:prstGeom prst="rect">
+            <a:avLst/>
+          </a:prstGeom>
+          <a:solidFill>
+            <a:schemeClr val="tx1">
+              <a:lumMod val="65000"/>
+              <a:lumOff val="35000"/>
+            </a:schemeClr>
+          </a:solidFill>
+          <a:ln>
+            <a:solidFill>
+              <a:schemeClr val="tx1"/>
+            </a:solidFill>
+          </a:ln>
+          <a:effectLst>
+            <a:outerShdw blurRad="50800" dist="38100" dir="5400000" algn="t" rotWithShape="0">
+              <a:prstClr val="black">
+                <a:alpha val="40000"/>
+              </a:prstClr>
+            </a:outerShdw>
+          </a:effectLst>
+        </p:spPr>
+        <p:style>
+          <a:lnRef idx="1">
+            <a:schemeClr val="accent4"/>
+          </a:lnRef>
+          <a:fillRef idx="2">
+            <a:schemeClr val="accent4"/>
+          </a:fillRef>
+          <a:effectRef idx="1">
+            <a:schemeClr val="accent4"/>
+          </a:effectRef>
+          <a:fontRef idx="minor">
+            <a:schemeClr val="dk1"/>
+          </a:fontRef>
+        </p:style>
+        <p:txBody>
+          <a:bodyPr lIns="0" tIns="0" rIns="0" bIns="0" rtlCol="0" anchor="ctr"/>
+          <a:lstStyle/>
+          <a:p>
+            <a:pPr algn="ctr"/>
+            <a:r>
+              <a:rPr lang="pt-BR" sz="800" dirty="0">
+                <a:solidFill>
+                  <a:schemeClr val="bg1"/>
+                </a:solidFill>
+              </a:rPr>
+              <a:t>Preços fixos que não refletem a complexidade do serviço.</a:t>
+            </a:r>
+            <a:endParaRPr lang="pt-BR" sz="800" dirty="0">
+              <a:solidFill>
+                <a:schemeClr val="bg1"/>
+              </a:solidFill>
+              <a:ea typeface="Calibri"/>
+              <a:cs typeface="Calibri"/>
+            </a:endParaRPr>
+          </a:p>
+        </p:txBody>
+      </p:sp>
+      <p:sp>
+        <p:nvSpPr>
+          <p:cNvPr id="47" name="Retângulo 46">
+            <a:extLst>
+              <a:ext uri="{FF2B5EF4-FFF2-40B4-BE49-F238E27FC236}">
+                <a16:creationId xmlns:a16="http://schemas.microsoft.com/office/drawing/2014/main" id="{B38DA91D-6406-CF0E-7679-9FE066C724B0}"/>
+              </a:ext>
+            </a:extLst>
+          </p:cNvPr>
+          <p:cNvSpPr/>
+          <p:nvPr/>
+        </p:nvSpPr>
+        <p:spPr>
+          <a:xfrm>
+            <a:off x="1142018" y="5905189"/>
+            <a:ext cx="900000" cy="528764"/>
+          </a:xfrm>
+          <a:prstGeom prst="rect">
+            <a:avLst/>
+          </a:prstGeom>
+          <a:solidFill>
+            <a:srgbClr val="FBAB53"/>
+          </a:solidFill>
+          <a:ln>
+            <a:solidFill>
+              <a:schemeClr val="accent2"/>
+            </a:solidFill>
+          </a:ln>
+          <a:effectLst>
+            <a:outerShdw blurRad="50800" dist="38100" dir="5400000" algn="t" rotWithShape="0">
+              <a:prstClr val="black">
+                <a:alpha val="40000"/>
+              </a:prstClr>
+            </a:outerShdw>
+          </a:effectLst>
+        </p:spPr>
+        <p:style>
+          <a:lnRef idx="1">
+            <a:schemeClr val="accent4"/>
+          </a:lnRef>
+          <a:fillRef idx="2">
+            <a:schemeClr val="accent4"/>
+          </a:fillRef>
+          <a:effectRef idx="1">
+            <a:schemeClr val="accent4"/>
+          </a:effectRef>
+          <a:fontRef idx="minor">
+            <a:schemeClr val="dk1"/>
+          </a:fontRef>
+        </p:style>
+        <p:txBody>
+          <a:bodyPr lIns="0" tIns="0" rIns="0" bIns="0" rtlCol="0" anchor="ctr"/>
+          <a:lstStyle/>
+          <a:p>
+            <a:pPr algn="ctr"/>
+            <a:r>
+              <a:rPr lang="pt-BR" sz="800" dirty="0"/>
+              <a:t>Propostas com valores personalizados pelos prestadores.</a:t>
             </a:r>
           </a:p>
         </p:txBody>

</xml_diff>